<commit_message>
Updates to plotting and extraction scripts
</commit_message>
<xml_diff>
--- a/Nigeria/Research/urban_rural_transmission_analysis/manuscript_scripts/plots/Plots_hist.pptx
+++ b/Nigeria/Research/urban_rural_transmission_analysis/manuscript_scripts/plots/Plots_hist.pptx
@@ -7,12 +7,14 @@
   <p:sldIdLst>
     <p:sldId id="262" r:id="rId2"/>
     <p:sldId id="260" r:id="rId3"/>
-    <p:sldId id="261" r:id="rId4"/>
-    <p:sldId id="263" r:id="rId5"/>
-    <p:sldId id="265" r:id="rId6"/>
-    <p:sldId id="264" r:id="rId7"/>
-    <p:sldId id="266" r:id="rId8"/>
-    <p:sldId id="267" r:id="rId9"/>
+    <p:sldId id="269" r:id="rId4"/>
+    <p:sldId id="261" r:id="rId5"/>
+    <p:sldId id="268" r:id="rId6"/>
+    <p:sldId id="263" r:id="rId7"/>
+    <p:sldId id="265" r:id="rId8"/>
+    <p:sldId id="264" r:id="rId9"/>
+    <p:sldId id="266" r:id="rId10"/>
+    <p:sldId id="267" r:id="rId11"/>
   </p:sldIdLst>
   <p:sldSz cx="12192000" cy="6858000"/>
   <p:notesSz cx="6858000" cy="9144000"/>
@@ -278,7 +280,7 @@
           <a:p>
             <a:fld id="{EC50E9FA-763F-4F8C-8F30-AFC93F0F1C5E}" type="datetimeFigureOut">
               <a:rPr lang="en-US" smtClean="0"/>
-              <a:t>6/23/2021</a:t>
+              <a:t>6/28/2021</a:t>
             </a:fld>
             <a:endParaRPr lang="en-US"/>
           </a:p>
@@ -476,7 +478,7 @@
           <a:p>
             <a:fld id="{EC50E9FA-763F-4F8C-8F30-AFC93F0F1C5E}" type="datetimeFigureOut">
               <a:rPr lang="en-US" smtClean="0"/>
-              <a:t>6/23/2021</a:t>
+              <a:t>6/28/2021</a:t>
             </a:fld>
             <a:endParaRPr lang="en-US"/>
           </a:p>
@@ -684,7 +686,7 @@
           <a:p>
             <a:fld id="{EC50E9FA-763F-4F8C-8F30-AFC93F0F1C5E}" type="datetimeFigureOut">
               <a:rPr lang="en-US" smtClean="0"/>
-              <a:t>6/23/2021</a:t>
+              <a:t>6/28/2021</a:t>
             </a:fld>
             <a:endParaRPr lang="en-US"/>
           </a:p>
@@ -882,7 +884,7 @@
           <a:p>
             <a:fld id="{EC50E9FA-763F-4F8C-8F30-AFC93F0F1C5E}" type="datetimeFigureOut">
               <a:rPr lang="en-US" smtClean="0"/>
-              <a:t>6/23/2021</a:t>
+              <a:t>6/28/2021</a:t>
             </a:fld>
             <a:endParaRPr lang="en-US"/>
           </a:p>
@@ -1157,7 +1159,7 @@
           <a:p>
             <a:fld id="{EC50E9FA-763F-4F8C-8F30-AFC93F0F1C5E}" type="datetimeFigureOut">
               <a:rPr lang="en-US" smtClean="0"/>
-              <a:t>6/23/2021</a:t>
+              <a:t>6/28/2021</a:t>
             </a:fld>
             <a:endParaRPr lang="en-US"/>
           </a:p>
@@ -1422,7 +1424,7 @@
           <a:p>
             <a:fld id="{EC50E9FA-763F-4F8C-8F30-AFC93F0F1C5E}" type="datetimeFigureOut">
               <a:rPr lang="en-US" smtClean="0"/>
-              <a:t>6/23/2021</a:t>
+              <a:t>6/28/2021</a:t>
             </a:fld>
             <a:endParaRPr lang="en-US"/>
           </a:p>
@@ -1834,7 +1836,7 @@
           <a:p>
             <a:fld id="{EC50E9FA-763F-4F8C-8F30-AFC93F0F1C5E}" type="datetimeFigureOut">
               <a:rPr lang="en-US" smtClean="0"/>
-              <a:t>6/23/2021</a:t>
+              <a:t>6/28/2021</a:t>
             </a:fld>
             <a:endParaRPr lang="en-US"/>
           </a:p>
@@ -1975,7 +1977,7 @@
           <a:p>
             <a:fld id="{EC50E9FA-763F-4F8C-8F30-AFC93F0F1C5E}" type="datetimeFigureOut">
               <a:rPr lang="en-US" smtClean="0"/>
-              <a:t>6/23/2021</a:t>
+              <a:t>6/28/2021</a:t>
             </a:fld>
             <a:endParaRPr lang="en-US"/>
           </a:p>
@@ -2088,7 +2090,7 @@
           <a:p>
             <a:fld id="{EC50E9FA-763F-4F8C-8F30-AFC93F0F1C5E}" type="datetimeFigureOut">
               <a:rPr lang="en-US" smtClean="0"/>
-              <a:t>6/23/2021</a:t>
+              <a:t>6/28/2021</a:t>
             </a:fld>
             <a:endParaRPr lang="en-US"/>
           </a:p>
@@ -2399,7 +2401,7 @@
           <a:p>
             <a:fld id="{EC50E9FA-763F-4F8C-8F30-AFC93F0F1C5E}" type="datetimeFigureOut">
               <a:rPr lang="en-US" smtClean="0"/>
-              <a:t>6/23/2021</a:t>
+              <a:t>6/28/2021</a:t>
             </a:fld>
             <a:endParaRPr lang="en-US"/>
           </a:p>
@@ -2687,7 +2689,7 @@
           <a:p>
             <a:fld id="{EC50E9FA-763F-4F8C-8F30-AFC93F0F1C5E}" type="datetimeFigureOut">
               <a:rPr lang="en-US" smtClean="0"/>
-              <a:t>6/23/2021</a:t>
+              <a:t>6/28/2021</a:t>
             </a:fld>
             <a:endParaRPr lang="en-US"/>
           </a:p>
@@ -2928,7 +2930,7 @@
           <a:p>
             <a:fld id="{EC50E9FA-763F-4F8C-8F30-AFC93F0F1C5E}" type="datetimeFigureOut">
               <a:rPr lang="en-US" smtClean="0"/>
-              <a:t>6/23/2021</a:t>
+              <a:t>6/28/2021</a:t>
             </a:fld>
             <a:endParaRPr lang="en-US"/>
           </a:p>
@@ -4038,6 +4040,112 @@
 </p:sld>
 </file>
 
+<file path=ppt/slides/slide10.xml><?xml version="1.0" encoding="utf-8"?>
+<p:sld xmlns:a="http://schemas.openxmlformats.org/drawingml/2006/main" xmlns:r="http://schemas.openxmlformats.org/officeDocument/2006/relationships" xmlns:p="http://schemas.openxmlformats.org/presentationml/2006/main">
+  <p:cSld>
+    <p:spTree>
+      <p:nvGrpSpPr>
+        <p:cNvPr id="1" name=""/>
+        <p:cNvGrpSpPr/>
+        <p:nvPr/>
+      </p:nvGrpSpPr>
+      <p:grpSpPr>
+        <a:xfrm>
+          <a:off x="0" y="0"/>
+          <a:ext cx="0" cy="0"/>
+          <a:chOff x="0" y="0"/>
+          <a:chExt cx="0" cy="0"/>
+        </a:xfrm>
+      </p:grpSpPr>
+      <p:sp>
+        <p:nvSpPr>
+          <p:cNvPr id="4" name="TextBox 3">
+            <a:extLst>
+              <a:ext uri="{FF2B5EF4-FFF2-40B4-BE49-F238E27FC236}">
+                <a16:creationId xmlns:a16="http://schemas.microsoft.com/office/drawing/2014/main" id="{4869CB4B-A638-40A2-8613-B812B8158962}"/>
+              </a:ext>
+            </a:extLst>
+          </p:cNvPr>
+          <p:cNvSpPr txBox="1"/>
+          <p:nvPr/>
+        </p:nvSpPr>
+        <p:spPr>
+          <a:xfrm>
+            <a:off x="1679894" y="150508"/>
+            <a:ext cx="8361728" cy="954107"/>
+          </a:xfrm>
+          <a:prstGeom prst="rect">
+            <a:avLst/>
+          </a:prstGeom>
+          <a:noFill/>
+        </p:spPr>
+        <p:txBody>
+          <a:bodyPr wrap="square" rtlCol="0">
+            <a:spAutoFit/>
+          </a:bodyPr>
+          <a:lstStyle/>
+          <a:p>
+            <a:pPr algn="ctr"/>
+            <a:r>
+              <a:rPr lang="en-US" sz="2800" dirty="0">
+                <a:solidFill>
+                  <a:srgbClr val="0070C0"/>
+                </a:solidFill>
+              </a:rPr>
+              <a:t>Elevation vary across different buffers sizes with cases of larger values in smaller buffers</a:t>
+            </a:r>
+          </a:p>
+        </p:txBody>
+      </p:sp>
+      <p:pic>
+        <p:nvPicPr>
+          <p:cNvPr id="3" name="Picture 2">
+            <a:extLst>
+              <a:ext uri="{FF2B5EF4-FFF2-40B4-BE49-F238E27FC236}">
+                <a16:creationId xmlns:a16="http://schemas.microsoft.com/office/drawing/2014/main" id="{B5394C07-DDB6-4F04-BE62-3A1607C967C3}"/>
+              </a:ext>
+            </a:extLst>
+          </p:cNvPr>
+          <p:cNvPicPr>
+            <a:picLocks noChangeAspect="1"/>
+          </p:cNvPicPr>
+          <p:nvPr/>
+        </p:nvPicPr>
+        <p:blipFill>
+          <a:blip r:embed="rId2">
+            <a:extLst>
+              <a:ext uri="{28A0092B-C50C-407E-A947-70E740481C1C}">
+                <a14:useLocalDpi xmlns:a14="http://schemas.microsoft.com/office/drawing/2010/main" val="0"/>
+              </a:ext>
+            </a:extLst>
+          </a:blip>
+          <a:stretch>
+            <a:fillRect/>
+          </a:stretch>
+        </p:blipFill>
+        <p:spPr>
+          <a:xfrm>
+            <a:off x="2173364" y="1610686"/>
+            <a:ext cx="8522599" cy="4937139"/>
+          </a:xfrm>
+          <a:prstGeom prst="rect">
+            <a:avLst/>
+          </a:prstGeom>
+        </p:spPr>
+      </p:pic>
+    </p:spTree>
+    <p:extLst>
+      <p:ext uri="{BB962C8B-B14F-4D97-AF65-F5344CB8AC3E}">
+        <p14:creationId xmlns:p14="http://schemas.microsoft.com/office/powerpoint/2010/main" val="1482524580"/>
+      </p:ext>
+    </p:extLst>
+  </p:cSld>
+  <p:clrMapOvr>
+    <a:masterClrMapping/>
+  </p:clrMapOvr>
+</p:sld>
+</file>
+
 <file path=ppt/slides/slide2.xml><?xml version="1.0" encoding="utf-8"?>
 <p:sld xmlns:a="http://schemas.openxmlformats.org/drawingml/2006/main" xmlns:r="http://schemas.openxmlformats.org/officeDocument/2006/relationships" xmlns:p="http://schemas.openxmlformats.org/presentationml/2006/main">
   <p:cSld>
@@ -4161,6 +4269,151 @@
           <a:chExt cx="0" cy="0"/>
         </a:xfrm>
       </p:grpSpPr>
+      <p:sp>
+        <p:nvSpPr>
+          <p:cNvPr id="3" name="TextBox 2">
+            <a:extLst>
+              <a:ext uri="{FF2B5EF4-FFF2-40B4-BE49-F238E27FC236}">
+                <a16:creationId xmlns:a16="http://schemas.microsoft.com/office/drawing/2014/main" id="{6CFD74A7-E6B5-4EB5-9C6D-54D46D032731}"/>
+              </a:ext>
+            </a:extLst>
+          </p:cNvPr>
+          <p:cNvSpPr txBox="1"/>
+          <p:nvPr/>
+        </p:nvSpPr>
+        <p:spPr>
+          <a:xfrm>
+            <a:off x="1679894" y="226503"/>
+            <a:ext cx="8361728" cy="523220"/>
+          </a:xfrm>
+          <a:prstGeom prst="rect">
+            <a:avLst/>
+          </a:prstGeom>
+          <a:noFill/>
+        </p:spPr>
+        <p:txBody>
+          <a:bodyPr wrap="square" rtlCol="0">
+            <a:spAutoFit/>
+          </a:bodyPr>
+          <a:lstStyle/>
+          <a:p>
+            <a:pPr algn="ctr"/>
+            <a:r>
+              <a:rPr lang="en-US" sz="2800" dirty="0">
+                <a:solidFill>
+                  <a:srgbClr val="0070C0"/>
+                </a:solidFill>
+              </a:rPr>
+              <a:t>30 Sec Pop Densities</a:t>
+            </a:r>
+          </a:p>
+        </p:txBody>
+      </p:sp>
+      <p:sp>
+        <p:nvSpPr>
+          <p:cNvPr id="2" name="AutoShape 2">
+            <a:extLst>
+              <a:ext uri="{FF2B5EF4-FFF2-40B4-BE49-F238E27FC236}">
+                <a16:creationId xmlns:a16="http://schemas.microsoft.com/office/drawing/2014/main" id="{678694E0-E3F0-4684-B379-97FDBE9A99F0}"/>
+              </a:ext>
+            </a:extLst>
+          </p:cNvPr>
+          <p:cNvSpPr>
+            <a:spLocks noChangeAspect="1" noChangeArrowheads="1"/>
+          </p:cNvSpPr>
+          <p:nvPr/>
+        </p:nvSpPr>
+        <p:spPr bwMode="auto">
+          <a:xfrm>
+            <a:off x="5943600" y="3276600"/>
+            <a:ext cx="304800" cy="304800"/>
+          </a:xfrm>
+          <a:prstGeom prst="rect">
+            <a:avLst/>
+          </a:prstGeom>
+          <a:noFill/>
+          <a:extLst>
+            <a:ext uri="{909E8E84-426E-40DD-AFC4-6F175D3DCCD1}">
+              <a14:hiddenFill xmlns:a14="http://schemas.microsoft.com/office/drawing/2010/main">
+                <a:solidFill>
+                  <a:srgbClr val="FFFFFF"/>
+                </a:solidFill>
+              </a14:hiddenFill>
+            </a:ext>
+          </a:extLst>
+        </p:spPr>
+        <p:txBody>
+          <a:bodyPr vert="horz" wrap="square" lIns="91440" tIns="45720" rIns="91440" bIns="45720" numCol="1" anchor="t" anchorCtr="0" compatLnSpc="1">
+            <a:prstTxWarp prst="textNoShape">
+              <a:avLst/>
+            </a:prstTxWarp>
+          </a:bodyPr>
+          <a:lstStyle/>
+          <a:p>
+            <a:endParaRPr lang="en-US"/>
+          </a:p>
+        </p:txBody>
+      </p:sp>
+      <p:pic>
+        <p:nvPicPr>
+          <p:cNvPr id="4" name="Picture 3">
+            <a:extLst>
+              <a:ext uri="{FF2B5EF4-FFF2-40B4-BE49-F238E27FC236}">
+                <a16:creationId xmlns:a16="http://schemas.microsoft.com/office/drawing/2014/main" id="{AE53CC88-3CA2-41E6-88C4-C70CEDE04E58}"/>
+              </a:ext>
+            </a:extLst>
+          </p:cNvPr>
+          <p:cNvPicPr>
+            <a:picLocks noChangeAspect="1"/>
+          </p:cNvPicPr>
+          <p:nvPr/>
+        </p:nvPicPr>
+        <p:blipFill>
+          <a:blip r:embed="rId2"/>
+          <a:stretch>
+            <a:fillRect/>
+          </a:stretch>
+        </p:blipFill>
+        <p:spPr>
+          <a:xfrm>
+            <a:off x="1753356" y="1450109"/>
+            <a:ext cx="8685287" cy="5309107"/>
+          </a:xfrm>
+          <a:prstGeom prst="rect">
+            <a:avLst/>
+          </a:prstGeom>
+        </p:spPr>
+      </p:pic>
+    </p:spTree>
+    <p:extLst>
+      <p:ext uri="{BB962C8B-B14F-4D97-AF65-F5344CB8AC3E}">
+        <p14:creationId xmlns:p14="http://schemas.microsoft.com/office/powerpoint/2010/main" val="207358629"/>
+      </p:ext>
+    </p:extLst>
+  </p:cSld>
+  <p:clrMapOvr>
+    <a:masterClrMapping/>
+  </p:clrMapOvr>
+</p:sld>
+</file>
+
+<file path=ppt/slides/slide4.xml><?xml version="1.0" encoding="utf-8"?>
+<p:sld xmlns:a="http://schemas.openxmlformats.org/drawingml/2006/main" xmlns:r="http://schemas.openxmlformats.org/officeDocument/2006/relationships" xmlns:p="http://schemas.openxmlformats.org/presentationml/2006/main">
+  <p:cSld>
+    <p:spTree>
+      <p:nvGrpSpPr>
+        <p:cNvPr id="1" name=""/>
+        <p:cNvGrpSpPr/>
+        <p:nvPr/>
+      </p:nvGrpSpPr>
+      <p:grpSpPr>
+        <a:xfrm>
+          <a:off x="0" y="0"/>
+          <a:ext cx="0" cy="0"/>
+          <a:chOff x="0" y="0"/>
+          <a:chExt cx="0" cy="0"/>
+        </a:xfrm>
+      </p:grpSpPr>
       <p:pic>
         <p:nvPicPr>
           <p:cNvPr id="3" name="Picture 2" descr="Graphical user interface, application, Teams&#10;&#10;Description automatically generated">
@@ -4250,7 +4503,107 @@
 </p:sld>
 </file>
 
-<file path=ppt/slides/slide4.xml><?xml version="1.0" encoding="utf-8"?>
+<file path=ppt/slides/slide5.xml><?xml version="1.0" encoding="utf-8"?>
+<p:sld xmlns:a="http://schemas.openxmlformats.org/drawingml/2006/main" xmlns:r="http://schemas.openxmlformats.org/officeDocument/2006/relationships" xmlns:p="http://schemas.openxmlformats.org/presentationml/2006/main">
+  <p:cSld>
+    <p:spTree>
+      <p:nvGrpSpPr>
+        <p:cNvPr id="1" name=""/>
+        <p:cNvGrpSpPr/>
+        <p:nvPr/>
+      </p:nvGrpSpPr>
+      <p:grpSpPr>
+        <a:xfrm>
+          <a:off x="0" y="0"/>
+          <a:ext cx="0" cy="0"/>
+          <a:chOff x="0" y="0"/>
+          <a:chExt cx="0" cy="0"/>
+        </a:xfrm>
+      </p:grpSpPr>
+      <p:sp>
+        <p:nvSpPr>
+          <p:cNvPr id="4" name="TextBox 3">
+            <a:extLst>
+              <a:ext uri="{FF2B5EF4-FFF2-40B4-BE49-F238E27FC236}">
+                <a16:creationId xmlns:a16="http://schemas.microsoft.com/office/drawing/2014/main" id="{4869CB4B-A638-40A2-8613-B812B8158962}"/>
+              </a:ext>
+            </a:extLst>
+          </p:cNvPr>
+          <p:cNvSpPr txBox="1"/>
+          <p:nvPr/>
+        </p:nvSpPr>
+        <p:spPr>
+          <a:xfrm>
+            <a:off x="1679894" y="150508"/>
+            <a:ext cx="8361728" cy="523220"/>
+          </a:xfrm>
+          <a:prstGeom prst="rect">
+            <a:avLst/>
+          </a:prstGeom>
+          <a:noFill/>
+        </p:spPr>
+        <p:txBody>
+          <a:bodyPr wrap="square" rtlCol="0">
+            <a:spAutoFit/>
+          </a:bodyPr>
+          <a:lstStyle/>
+          <a:p>
+            <a:pPr algn="ctr"/>
+            <a:r>
+              <a:rPr lang="en-US" sz="2800" dirty="0">
+                <a:solidFill>
+                  <a:srgbClr val="0070C0"/>
+                </a:solidFill>
+              </a:rPr>
+              <a:t>30 Sec Pop Densities</a:t>
+            </a:r>
+          </a:p>
+        </p:txBody>
+      </p:sp>
+      <p:pic>
+        <p:nvPicPr>
+          <p:cNvPr id="2" name="Picture 1">
+            <a:extLst>
+              <a:ext uri="{FF2B5EF4-FFF2-40B4-BE49-F238E27FC236}">
+                <a16:creationId xmlns:a16="http://schemas.microsoft.com/office/drawing/2014/main" id="{50AC37FA-5BEE-46D5-B115-C4A0FEF1F959}"/>
+              </a:ext>
+            </a:extLst>
+          </p:cNvPr>
+          <p:cNvPicPr>
+            <a:picLocks noChangeAspect="1"/>
+          </p:cNvPicPr>
+          <p:nvPr/>
+        </p:nvPicPr>
+        <p:blipFill>
+          <a:blip r:embed="rId2"/>
+          <a:stretch>
+            <a:fillRect/>
+          </a:stretch>
+        </p:blipFill>
+        <p:spPr>
+          <a:xfrm>
+            <a:off x="1503974" y="1173018"/>
+            <a:ext cx="9184051" cy="5613990"/>
+          </a:xfrm>
+          <a:prstGeom prst="rect">
+            <a:avLst/>
+          </a:prstGeom>
+        </p:spPr>
+      </p:pic>
+    </p:spTree>
+    <p:extLst>
+      <p:ext uri="{BB962C8B-B14F-4D97-AF65-F5344CB8AC3E}">
+        <p14:creationId xmlns:p14="http://schemas.microsoft.com/office/powerpoint/2010/main" val="268872337"/>
+      </p:ext>
+    </p:extLst>
+  </p:cSld>
+  <p:clrMapOvr>
+    <a:masterClrMapping/>
+  </p:clrMapOvr>
+</p:sld>
+</file>
+
+<file path=ppt/slides/slide6.xml><?xml version="1.0" encoding="utf-8"?>
 <p:sld xmlns:a="http://schemas.openxmlformats.org/drawingml/2006/main" xmlns:r="http://schemas.openxmlformats.org/officeDocument/2006/relationships" xmlns:p="http://schemas.openxmlformats.org/presentationml/2006/main">
   <p:cSld>
     <p:spTree>
@@ -4641,7 +4994,7 @@
 </p:sld>
 </file>
 
-<file path=ppt/slides/slide5.xml><?xml version="1.0" encoding="utf-8"?>
+<file path=ppt/slides/slide7.xml><?xml version="1.0" encoding="utf-8"?>
 <p:sld xmlns:a="http://schemas.openxmlformats.org/drawingml/2006/main" xmlns:r="http://schemas.openxmlformats.org/officeDocument/2006/relationships" xmlns:p="http://schemas.openxmlformats.org/presentationml/2006/main">
   <p:cSld>
     <p:spTree>
@@ -4831,7 +5184,7 @@
 </p:sld>
 </file>
 
-<file path=ppt/slides/slide6.xml><?xml version="1.0" encoding="utf-8"?>
+<file path=ppt/slides/slide8.xml><?xml version="1.0" encoding="utf-8"?>
 <p:sld xmlns:a="http://schemas.openxmlformats.org/drawingml/2006/main" xmlns:r="http://schemas.openxmlformats.org/officeDocument/2006/relationships" xmlns:p="http://schemas.openxmlformats.org/presentationml/2006/main">
   <p:cSld>
     <p:spTree>
@@ -4937,7 +5290,7 @@
 </p:sld>
 </file>
 
-<file path=ppt/slides/slide7.xml><?xml version="1.0" encoding="utf-8"?>
+<file path=ppt/slides/slide9.xml><?xml version="1.0" encoding="utf-8"?>
 <p:sld xmlns:a="http://schemas.openxmlformats.org/drawingml/2006/main" xmlns:r="http://schemas.openxmlformats.org/officeDocument/2006/relationships" xmlns:p="http://schemas.openxmlformats.org/presentationml/2006/main">
   <p:cSld>
     <p:spTree>
@@ -5118,112 +5471,6 @@
     <p:extLst>
       <p:ext uri="{BB962C8B-B14F-4D97-AF65-F5344CB8AC3E}">
         <p14:creationId xmlns:p14="http://schemas.microsoft.com/office/powerpoint/2010/main" val="1995733000"/>
-      </p:ext>
-    </p:extLst>
-  </p:cSld>
-  <p:clrMapOvr>
-    <a:masterClrMapping/>
-  </p:clrMapOvr>
-</p:sld>
-</file>
-
-<file path=ppt/slides/slide8.xml><?xml version="1.0" encoding="utf-8"?>
-<p:sld xmlns:a="http://schemas.openxmlformats.org/drawingml/2006/main" xmlns:r="http://schemas.openxmlformats.org/officeDocument/2006/relationships" xmlns:p="http://schemas.openxmlformats.org/presentationml/2006/main">
-  <p:cSld>
-    <p:spTree>
-      <p:nvGrpSpPr>
-        <p:cNvPr id="1" name=""/>
-        <p:cNvGrpSpPr/>
-        <p:nvPr/>
-      </p:nvGrpSpPr>
-      <p:grpSpPr>
-        <a:xfrm>
-          <a:off x="0" y="0"/>
-          <a:ext cx="0" cy="0"/>
-          <a:chOff x="0" y="0"/>
-          <a:chExt cx="0" cy="0"/>
-        </a:xfrm>
-      </p:grpSpPr>
-      <p:sp>
-        <p:nvSpPr>
-          <p:cNvPr id="4" name="TextBox 3">
-            <a:extLst>
-              <a:ext uri="{FF2B5EF4-FFF2-40B4-BE49-F238E27FC236}">
-                <a16:creationId xmlns:a16="http://schemas.microsoft.com/office/drawing/2014/main" id="{4869CB4B-A638-40A2-8613-B812B8158962}"/>
-              </a:ext>
-            </a:extLst>
-          </p:cNvPr>
-          <p:cNvSpPr txBox="1"/>
-          <p:nvPr/>
-        </p:nvSpPr>
-        <p:spPr>
-          <a:xfrm>
-            <a:off x="1679894" y="150508"/>
-            <a:ext cx="8361728" cy="954107"/>
-          </a:xfrm>
-          <a:prstGeom prst="rect">
-            <a:avLst/>
-          </a:prstGeom>
-          <a:noFill/>
-        </p:spPr>
-        <p:txBody>
-          <a:bodyPr wrap="square" rtlCol="0">
-            <a:spAutoFit/>
-          </a:bodyPr>
-          <a:lstStyle/>
-          <a:p>
-            <a:pPr algn="ctr"/>
-            <a:r>
-              <a:rPr lang="en-US" sz="2800" dirty="0">
-                <a:solidFill>
-                  <a:srgbClr val="0070C0"/>
-                </a:solidFill>
-              </a:rPr>
-              <a:t>Elevation vary across different buffers sizes with cases of larger values in smaller buffers</a:t>
-            </a:r>
-          </a:p>
-        </p:txBody>
-      </p:sp>
-      <p:pic>
-        <p:nvPicPr>
-          <p:cNvPr id="3" name="Picture 2">
-            <a:extLst>
-              <a:ext uri="{FF2B5EF4-FFF2-40B4-BE49-F238E27FC236}">
-                <a16:creationId xmlns:a16="http://schemas.microsoft.com/office/drawing/2014/main" id="{B5394C07-DDB6-4F04-BE62-3A1607C967C3}"/>
-              </a:ext>
-            </a:extLst>
-          </p:cNvPr>
-          <p:cNvPicPr>
-            <a:picLocks noChangeAspect="1"/>
-          </p:cNvPicPr>
-          <p:nvPr/>
-        </p:nvPicPr>
-        <p:blipFill>
-          <a:blip r:embed="rId2">
-            <a:extLst>
-              <a:ext uri="{28A0092B-C50C-407E-A947-70E740481C1C}">
-                <a14:useLocalDpi xmlns:a14="http://schemas.microsoft.com/office/drawing/2010/main" val="0"/>
-              </a:ext>
-            </a:extLst>
-          </a:blip>
-          <a:stretch>
-            <a:fillRect/>
-          </a:stretch>
-        </p:blipFill>
-        <p:spPr>
-          <a:xfrm>
-            <a:off x="2173364" y="1610686"/>
-            <a:ext cx="8522599" cy="4937139"/>
-          </a:xfrm>
-          <a:prstGeom prst="rect">
-            <a:avLst/>
-          </a:prstGeom>
-        </p:spPr>
-      </p:pic>
-    </p:spTree>
-    <p:extLst>
-      <p:ext uri="{BB962C8B-B14F-4D97-AF65-F5344CB8AC3E}">
-        <p14:creationId xmlns:p14="http://schemas.microsoft.com/office/powerpoint/2010/main" val="1482524580"/>
       </p:ext>
     </p:extLst>
   </p:cSld>

</xml_diff>